<commit_message>
Se combinaron todos los datasets de dengue
</commit_message>
<xml_diff>
--- a/Presentacion 2 - Grupo 3 - Ignacio Barrientos, Tomas Mandril, Lucrecia Veron.pptx
+++ b/Presentacion 2 - Grupo 3 - Ignacio Barrientos, Tomas Mandril, Lucrecia Veron.pptx
@@ -9,33 +9,32 @@
     <p:sldId id="257" r:id="rId3"/>
     <p:sldId id="258" r:id="rId4"/>
     <p:sldId id="260" r:id="rId5"/>
-    <p:sldId id="261" r:id="rId6"/>
   </p:sldIdLst>
   <p:sldSz cx="18288000" cy="10287000"/>
   <p:notesSz cx="6858000" cy="9144000"/>
   <p:embeddedFontLst>
     <p:embeddedFont>
       <p:font typeface="Aileron" panose="020B0604020202020204" charset="0"/>
+      <p:regular r:id="rId6"/>
+    </p:embeddedFont>
+    <p:embeddedFont>
+      <p:font typeface="Aileron Ultra-Bold" panose="020B0604020202020204" charset="0"/>
       <p:regular r:id="rId7"/>
     </p:embeddedFont>
     <p:embeddedFont>
-      <p:font typeface="Aileron Ultra-Bold" panose="020B0604020202020204" charset="0"/>
+      <p:font typeface="Calibri" panose="020F0502020204030204" pitchFamily="34" charset="0"/>
       <p:regular r:id="rId8"/>
-    </p:embeddedFont>
-    <p:embeddedFont>
-      <p:font typeface="Calibri" panose="020F0502020204030204" pitchFamily="34" charset="0"/>
-      <p:regular r:id="rId9"/>
-      <p:bold r:id="rId10"/>
-      <p:italic r:id="rId11"/>
-      <p:boldItalic r:id="rId12"/>
+      <p:bold r:id="rId9"/>
+      <p:italic r:id="rId10"/>
+      <p:boldItalic r:id="rId11"/>
     </p:embeddedFont>
     <p:embeddedFont>
       <p:font typeface="Open Sans Bold" panose="020B0604020202020204" charset="0"/>
-      <p:regular r:id="rId13"/>
+      <p:regular r:id="rId12"/>
     </p:embeddedFont>
     <p:embeddedFont>
       <p:font typeface="Roboto" panose="02000000000000000000" pitchFamily="2" charset="0"/>
-      <p:regular r:id="rId14"/>
+      <p:regular r:id="rId13"/>
     </p:embeddedFont>
   </p:embeddedFontLst>
   <p:defaultTextStyle>
@@ -332,7 +331,7 @@
             <a:fld id="{1D8BD707-D9CF-40AE-B4C6-C98DA3205C09}" type="datetimeFigureOut">
               <a:rPr lang="en-US" smtClean="0"/>
               <a:pPr/>
-              <a:t>8/20/2023</a:t>
+              <a:t>8/21/2023</a:t>
             </a:fld>
             <a:endParaRPr lang="en-US"/>
           </a:p>
@@ -497,7 +496,7 @@
             <a:fld id="{1D8BD707-D9CF-40AE-B4C6-C98DA3205C09}" type="datetimeFigureOut">
               <a:rPr lang="en-US" smtClean="0"/>
               <a:pPr/>
-              <a:t>8/20/2023</a:t>
+              <a:t>8/21/2023</a:t>
             </a:fld>
             <a:endParaRPr lang="en-US"/>
           </a:p>
@@ -672,7 +671,7 @@
             <a:fld id="{1D8BD707-D9CF-40AE-B4C6-C98DA3205C09}" type="datetimeFigureOut">
               <a:rPr lang="en-US" smtClean="0"/>
               <a:pPr/>
-              <a:t>8/20/2023</a:t>
+              <a:t>8/21/2023</a:t>
             </a:fld>
             <a:endParaRPr lang="en-US"/>
           </a:p>
@@ -837,7 +836,7 @@
             <a:fld id="{1D8BD707-D9CF-40AE-B4C6-C98DA3205C09}" type="datetimeFigureOut">
               <a:rPr lang="en-US" smtClean="0"/>
               <a:pPr/>
-              <a:t>8/20/2023</a:t>
+              <a:t>8/21/2023</a:t>
             </a:fld>
             <a:endParaRPr lang="en-US"/>
           </a:p>
@@ -1079,7 +1078,7 @@
             <a:fld id="{1D8BD707-D9CF-40AE-B4C6-C98DA3205C09}" type="datetimeFigureOut">
               <a:rPr lang="en-US" smtClean="0"/>
               <a:pPr/>
-              <a:t>8/20/2023</a:t>
+              <a:t>8/21/2023</a:t>
             </a:fld>
             <a:endParaRPr lang="en-US"/>
           </a:p>
@@ -1361,7 +1360,7 @@
             <a:fld id="{1D8BD707-D9CF-40AE-B4C6-C98DA3205C09}" type="datetimeFigureOut">
               <a:rPr lang="en-US" smtClean="0"/>
               <a:pPr/>
-              <a:t>8/20/2023</a:t>
+              <a:t>8/21/2023</a:t>
             </a:fld>
             <a:endParaRPr lang="en-US"/>
           </a:p>
@@ -1777,7 +1776,7 @@
             <a:fld id="{1D8BD707-D9CF-40AE-B4C6-C98DA3205C09}" type="datetimeFigureOut">
               <a:rPr lang="en-US" smtClean="0"/>
               <a:pPr/>
-              <a:t>8/20/2023</a:t>
+              <a:t>8/21/2023</a:t>
             </a:fld>
             <a:endParaRPr lang="en-US"/>
           </a:p>
@@ -1891,7 +1890,7 @@
             <a:fld id="{1D8BD707-D9CF-40AE-B4C6-C98DA3205C09}" type="datetimeFigureOut">
               <a:rPr lang="en-US" smtClean="0"/>
               <a:pPr/>
-              <a:t>8/20/2023</a:t>
+              <a:t>8/21/2023</a:t>
             </a:fld>
             <a:endParaRPr lang="en-US"/>
           </a:p>
@@ -1983,7 +1982,7 @@
             <a:fld id="{1D8BD707-D9CF-40AE-B4C6-C98DA3205C09}" type="datetimeFigureOut">
               <a:rPr lang="en-US" smtClean="0"/>
               <a:pPr/>
-              <a:t>8/20/2023</a:t>
+              <a:t>8/21/2023</a:t>
             </a:fld>
             <a:endParaRPr lang="en-US"/>
           </a:p>
@@ -2255,7 +2254,7 @@
             <a:fld id="{1D8BD707-D9CF-40AE-B4C6-C98DA3205C09}" type="datetimeFigureOut">
               <a:rPr lang="en-US" smtClean="0"/>
               <a:pPr/>
-              <a:t>8/20/2023</a:t>
+              <a:t>8/21/2023</a:t>
             </a:fld>
             <a:endParaRPr lang="en-US"/>
           </a:p>
@@ -2504,7 +2503,7 @@
             <a:fld id="{1D8BD707-D9CF-40AE-B4C6-C98DA3205C09}" type="datetimeFigureOut">
               <a:rPr lang="en-US" smtClean="0"/>
               <a:pPr/>
-              <a:t>8/20/2023</a:t>
+              <a:t>8/21/2023</a:t>
             </a:fld>
             <a:endParaRPr lang="en-US"/>
           </a:p>
@@ -2712,7 +2711,7 @@
             <a:fld id="{1D8BD707-D9CF-40AE-B4C6-C98DA3205C09}" type="datetimeFigureOut">
               <a:rPr lang="en-US" smtClean="0"/>
               <a:pPr/>
-              <a:t>8/20/2023</a:t>
+              <a:t>8/21/2023</a:t>
             </a:fld>
             <a:endParaRPr lang="en-US"/>
           </a:p>
@@ -4960,7 +4959,7 @@
                 </a:solidFill>
                 <a:latin typeface="Aileron Ultra-Bold"/>
               </a:rPr>
-              <a:t>Algoritmos considerados</a:t>
+              <a:t>Algoritmo utilizado</a:t>
             </a:r>
             <a:endParaRPr lang="es-AR" sz="7867" dirty="0">
               <a:solidFill>
@@ -5013,7 +5012,7 @@
                 </a:solidFill>
                 <a:latin typeface="Roboto"/>
               </a:rPr>
-              <a:t>Regresión logística y regresión linear</a:t>
+              <a:t>Regresión linear</a:t>
             </a:r>
           </a:p>
           <a:p>
@@ -5034,6 +5033,53 @@
           </a:p>
         </p:txBody>
       </p:sp>
+      <p:pic>
+        <p:nvPicPr>
+          <p:cNvPr id="1026" name="Picture 2" descr="Regresión lineal - Wikipedia, la enciclopedia libre">
+            <a:extLst>
+              <a:ext uri="{FF2B5EF4-FFF2-40B4-BE49-F238E27FC236}">
+                <a16:creationId xmlns:a16="http://schemas.microsoft.com/office/drawing/2014/main" id="{E6A6C765-0818-5458-DE3B-A1BF05705ADB}"/>
+              </a:ext>
+            </a:extLst>
+          </p:cNvPr>
+          <p:cNvPicPr>
+            <a:picLocks noChangeAspect="1" noChangeArrowheads="1"/>
+          </p:cNvPicPr>
+          <p:nvPr/>
+        </p:nvPicPr>
+        <p:blipFill>
+          <a:blip r:embed="rId8">
+            <a:extLst>
+              <a:ext uri="{28A0092B-C50C-407E-A947-70E740481C1C}">
+                <a14:useLocalDpi xmlns:a14="http://schemas.microsoft.com/office/drawing/2010/main" val="0"/>
+              </a:ext>
+            </a:extLst>
+          </a:blip>
+          <a:srcRect/>
+          <a:stretch>
+            <a:fillRect/>
+          </a:stretch>
+        </p:blipFill>
+        <p:spPr bwMode="auto">
+          <a:xfrm>
+            <a:off x="9906000" y="6444151"/>
+            <a:ext cx="5010464" cy="3315257"/>
+          </a:xfrm>
+          <a:prstGeom prst="rect">
+            <a:avLst/>
+          </a:prstGeom>
+          <a:noFill/>
+          <a:extLst>
+            <a:ext uri="{909E8E84-426E-40DD-AFC4-6F175D3DCCD1}">
+              <a14:hiddenFill xmlns:a14="http://schemas.microsoft.com/office/drawing/2010/main">
+                <a:solidFill>
+                  <a:srgbClr val="FFFFFF"/>
+                </a:solidFill>
+              </a14:hiddenFill>
+            </a:ext>
+          </a:extLst>
+        </p:spPr>
+      </p:pic>
     </p:spTree>
   </p:cSld>
   <p:clrMapOvr>
@@ -5389,7 +5435,7 @@
                 </a:solidFill>
                 <a:latin typeface="Roboto"/>
               </a:rPr>
-              <a:t>Permite no-linealidad</a:t>
+              <a:t>Funciona mejor con booleanos</a:t>
             </a:r>
           </a:p>
           <a:p>
@@ -5864,424 +5910,6 @@
         </p:txBody>
       </p:sp>
     </p:spTree>
-  </p:cSld>
-  <p:clrMapOvr>
-    <a:masterClrMapping/>
-  </p:clrMapOvr>
-</p:sld>
-</file>
-
-<file path=ppt/slides/slide5.xml><?xml version="1.0" encoding="utf-8"?>
-<p:sld xmlns:a="http://schemas.openxmlformats.org/drawingml/2006/main" xmlns:r="http://schemas.openxmlformats.org/officeDocument/2006/relationships" xmlns:p="http://schemas.openxmlformats.org/presentationml/2006/main">
-  <p:cSld>
-    <p:bg>
-      <p:bgPr>
-        <a:solidFill>
-          <a:srgbClr val="17161C"/>
-        </a:solidFill>
-        <a:effectLst/>
-      </p:bgPr>
-    </p:bg>
-    <p:spTree>
-      <p:nvGrpSpPr>
-        <p:cNvPr id="1" name=""/>
-        <p:cNvGrpSpPr/>
-        <p:nvPr/>
-      </p:nvGrpSpPr>
-      <p:grpSpPr>
-        <a:xfrm>
-          <a:off x="0" y="0"/>
-          <a:ext cx="0" cy="0"/>
-          <a:chOff x="0" y="0"/>
-          <a:chExt cx="0" cy="0"/>
-        </a:xfrm>
-      </p:grpSpPr>
-      <p:sp>
-        <p:nvSpPr>
-          <p:cNvPr id="2" name="Freeform 2"/>
-          <p:cNvSpPr/>
-          <p:nvPr/>
-        </p:nvSpPr>
-        <p:spPr>
-          <a:xfrm flipV="1">
-            <a:off x="0" y="0"/>
-            <a:ext cx="1892551" cy="3379556"/>
-          </a:xfrm>
-          <a:custGeom>
-            <a:avLst/>
-            <a:gdLst/>
-            <a:ahLst/>
-            <a:cxnLst/>
-            <a:rect l="l" t="t" r="r" b="b"/>
-            <a:pathLst>
-              <a:path w="1892551" h="3379556">
-                <a:moveTo>
-                  <a:pt x="0" y="3379556"/>
-                </a:moveTo>
-                <a:lnTo>
-                  <a:pt x="1892551" y="3379556"/>
-                </a:lnTo>
-                <a:lnTo>
-                  <a:pt x="1892551" y="0"/>
-                </a:lnTo>
-                <a:lnTo>
-                  <a:pt x="0" y="0"/>
-                </a:lnTo>
-                <a:lnTo>
-                  <a:pt x="0" y="3379556"/>
-                </a:lnTo>
-                <a:close/>
-              </a:path>
-            </a:pathLst>
-          </a:custGeom>
-          <a:blipFill>
-            <a:blip r:embed="rId2">
-              <a:extLst>
-                <a:ext uri="{96DAC541-7B7A-43D3-8B79-37D633B846F1}">
-                  <asvg:svgBlip xmlns:asvg="http://schemas.microsoft.com/office/drawing/2016/SVG/main" r:embed="rId3"/>
-                </a:ext>
-              </a:extLst>
-            </a:blip>
-            <a:stretch>
-              <a:fillRect/>
-            </a:stretch>
-          </a:blipFill>
-        </p:spPr>
-        <p:txBody>
-          <a:bodyPr/>
-          <a:lstStyle/>
-          <a:p>
-            <a:endParaRPr lang="es-AR"/>
-          </a:p>
-        </p:txBody>
-      </p:sp>
-      <p:sp>
-        <p:nvSpPr>
-          <p:cNvPr id="3" name="Freeform 3"/>
-          <p:cNvSpPr/>
-          <p:nvPr/>
-        </p:nvSpPr>
-        <p:spPr>
-          <a:xfrm rot="-10800000">
-            <a:off x="-211377" y="1521817"/>
-            <a:ext cx="3095939" cy="2879223"/>
-          </a:xfrm>
-          <a:custGeom>
-            <a:avLst/>
-            <a:gdLst/>
-            <a:ahLst/>
-            <a:cxnLst/>
-            <a:rect l="l" t="t" r="r" b="b"/>
-            <a:pathLst>
-              <a:path w="3095939" h="2879223">
-                <a:moveTo>
-                  <a:pt x="0" y="0"/>
-                </a:moveTo>
-                <a:lnTo>
-                  <a:pt x="3095939" y="0"/>
-                </a:lnTo>
-                <a:lnTo>
-                  <a:pt x="3095939" y="2879223"/>
-                </a:lnTo>
-                <a:lnTo>
-                  <a:pt x="0" y="2879223"/>
-                </a:lnTo>
-                <a:lnTo>
-                  <a:pt x="0" y="0"/>
-                </a:lnTo>
-                <a:close/>
-              </a:path>
-            </a:pathLst>
-          </a:custGeom>
-          <a:blipFill>
-            <a:blip r:embed="rId4">
-              <a:extLst>
-                <a:ext uri="{96DAC541-7B7A-43D3-8B79-37D633B846F1}">
-                  <asvg:svgBlip xmlns:asvg="http://schemas.microsoft.com/office/drawing/2016/SVG/main" r:embed="rId5"/>
-                </a:ext>
-              </a:extLst>
-            </a:blip>
-            <a:stretch>
-              <a:fillRect/>
-            </a:stretch>
-          </a:blipFill>
-        </p:spPr>
-        <p:txBody>
-          <a:bodyPr/>
-          <a:lstStyle/>
-          <a:p>
-            <a:endParaRPr lang="es-AR"/>
-          </a:p>
-        </p:txBody>
-      </p:sp>
-      <p:sp>
-        <p:nvSpPr>
-          <p:cNvPr id="4" name="Freeform 4"/>
-          <p:cNvSpPr/>
-          <p:nvPr/>
-        </p:nvSpPr>
-        <p:spPr>
-          <a:xfrm rot="-10800000">
-            <a:off x="-211377" y="4917851"/>
-            <a:ext cx="3095939" cy="2879223"/>
-          </a:xfrm>
-          <a:custGeom>
-            <a:avLst/>
-            <a:gdLst/>
-            <a:ahLst/>
-            <a:cxnLst/>
-            <a:rect l="l" t="t" r="r" b="b"/>
-            <a:pathLst>
-              <a:path w="3095939" h="2879223">
-                <a:moveTo>
-                  <a:pt x="0" y="0"/>
-                </a:moveTo>
-                <a:lnTo>
-                  <a:pt x="3095939" y="0"/>
-                </a:lnTo>
-                <a:lnTo>
-                  <a:pt x="3095939" y="2879223"/>
-                </a:lnTo>
-                <a:lnTo>
-                  <a:pt x="0" y="2879223"/>
-                </a:lnTo>
-                <a:lnTo>
-                  <a:pt x="0" y="0"/>
-                </a:lnTo>
-                <a:close/>
-              </a:path>
-            </a:pathLst>
-          </a:custGeom>
-          <a:blipFill>
-            <a:blip r:embed="rId4">
-              <a:extLst>
-                <a:ext uri="{96DAC541-7B7A-43D3-8B79-37D633B846F1}">
-                  <asvg:svgBlip xmlns:asvg="http://schemas.microsoft.com/office/drawing/2016/SVG/main" r:embed="rId5"/>
-                </a:ext>
-              </a:extLst>
-            </a:blip>
-            <a:stretch>
-              <a:fillRect/>
-            </a:stretch>
-          </a:blipFill>
-        </p:spPr>
-        <p:txBody>
-          <a:bodyPr/>
-          <a:lstStyle/>
-          <a:p>
-            <a:endParaRPr lang="es-AR"/>
-          </a:p>
-        </p:txBody>
-      </p:sp>
-      <p:sp>
-        <p:nvSpPr>
-          <p:cNvPr id="12" name="TextBox 12"/>
-          <p:cNvSpPr txBox="1"/>
-          <p:nvPr/>
-        </p:nvSpPr>
-        <p:spPr>
-          <a:xfrm>
-            <a:off x="3415450" y="3543300"/>
-            <a:ext cx="7071360" cy="2310889"/>
-          </a:xfrm>
-          <a:prstGeom prst="rect">
-            <a:avLst/>
-          </a:prstGeom>
-        </p:spPr>
-        <p:txBody>
-          <a:bodyPr wrap="square" lIns="0" tIns="0" rIns="0" bIns="0" rtlCol="0" anchor="t">
-            <a:spAutoFit/>
-          </a:bodyPr>
-          <a:lstStyle/>
-          <a:p>
-            <a:pPr marL="342900" indent="-342900">
-              <a:lnSpc>
-                <a:spcPct val="150000"/>
-              </a:lnSpc>
-              <a:spcBef>
-                <a:spcPct val="0"/>
-              </a:spcBef>
-              <a:buClr>
-                <a:schemeClr val="accent1"/>
-              </a:buClr>
-              <a:buFont typeface="Arial" panose="020B0604020202020204" pitchFamily="34" charset="0"/>
-              <a:buChar char="•"/>
-            </a:pPr>
-            <a:endParaRPr lang="es-AR" sz="3200" dirty="0">
-              <a:solidFill>
-                <a:srgbClr val="F7F4FA"/>
-              </a:solidFill>
-              <a:latin typeface="Roboto"/>
-            </a:endParaRPr>
-          </a:p>
-          <a:p>
-            <a:pPr marL="342900" indent="-342900">
-              <a:lnSpc>
-                <a:spcPct val="150000"/>
-              </a:lnSpc>
-              <a:spcBef>
-                <a:spcPct val="0"/>
-              </a:spcBef>
-              <a:buClr>
-                <a:schemeClr val="accent1"/>
-              </a:buClr>
-              <a:buFont typeface="Arial" panose="020B0604020202020204" pitchFamily="34" charset="0"/>
-              <a:buChar char="•"/>
-            </a:pPr>
-            <a:endParaRPr lang="es-AR" sz="3200" dirty="0">
-              <a:solidFill>
-                <a:srgbClr val="F7F4FA"/>
-              </a:solidFill>
-              <a:latin typeface="Roboto"/>
-            </a:endParaRPr>
-          </a:p>
-          <a:p>
-            <a:pPr marL="342900" indent="-342900">
-              <a:lnSpc>
-                <a:spcPts val="3164"/>
-              </a:lnSpc>
-              <a:spcBef>
-                <a:spcPct val="0"/>
-              </a:spcBef>
-              <a:buClr>
-                <a:schemeClr val="accent1"/>
-              </a:buClr>
-              <a:buFont typeface="Arial" panose="020B0604020202020204" pitchFamily="34" charset="0"/>
-              <a:buChar char="•"/>
-            </a:pPr>
-            <a:endParaRPr lang="en-US" sz="3200" dirty="0">
-              <a:solidFill>
-                <a:srgbClr val="F7F4FA"/>
-              </a:solidFill>
-              <a:latin typeface="Roboto"/>
-            </a:endParaRPr>
-          </a:p>
-          <a:p>
-            <a:pPr marL="342900" indent="-342900">
-              <a:lnSpc>
-                <a:spcPts val="3164"/>
-              </a:lnSpc>
-              <a:spcBef>
-                <a:spcPct val="0"/>
-              </a:spcBef>
-              <a:buClr>
-                <a:schemeClr val="accent1"/>
-              </a:buClr>
-              <a:buFont typeface="Arial" panose="020B0604020202020204" pitchFamily="34" charset="0"/>
-              <a:buChar char="•"/>
-            </a:pPr>
-            <a:endParaRPr lang="es-AR" sz="3600" dirty="0">
-              <a:solidFill>
-                <a:srgbClr val="F7F4FA"/>
-              </a:solidFill>
-              <a:latin typeface="Roboto"/>
-            </a:endParaRPr>
-          </a:p>
-        </p:txBody>
-      </p:sp>
-      <p:sp>
-        <p:nvSpPr>
-          <p:cNvPr id="16" name="Freeform 16"/>
-          <p:cNvSpPr/>
-          <p:nvPr/>
-        </p:nvSpPr>
-        <p:spPr>
-          <a:xfrm rot="-10800000">
-            <a:off x="-211377" y="8300059"/>
-            <a:ext cx="3095939" cy="2879223"/>
-          </a:xfrm>
-          <a:custGeom>
-            <a:avLst/>
-            <a:gdLst/>
-            <a:ahLst/>
-            <a:cxnLst/>
-            <a:rect l="l" t="t" r="r" b="b"/>
-            <a:pathLst>
-              <a:path w="3095939" h="2879223">
-                <a:moveTo>
-                  <a:pt x="0" y="0"/>
-                </a:moveTo>
-                <a:lnTo>
-                  <a:pt x="3095939" y="0"/>
-                </a:lnTo>
-                <a:lnTo>
-                  <a:pt x="3095939" y="2879223"/>
-                </a:lnTo>
-                <a:lnTo>
-                  <a:pt x="0" y="2879223"/>
-                </a:lnTo>
-                <a:lnTo>
-                  <a:pt x="0" y="0"/>
-                </a:lnTo>
-                <a:close/>
-              </a:path>
-            </a:pathLst>
-          </a:custGeom>
-          <a:blipFill>
-            <a:blip r:embed="rId4">
-              <a:extLst>
-                <a:ext uri="{96DAC541-7B7A-43D3-8B79-37D633B846F1}">
-                  <asvg:svgBlip xmlns:asvg="http://schemas.microsoft.com/office/drawing/2016/SVG/main" r:embed="rId5"/>
-                </a:ext>
-              </a:extLst>
-            </a:blip>
-            <a:stretch>
-              <a:fillRect/>
-            </a:stretch>
-          </a:blipFill>
-        </p:spPr>
-        <p:txBody>
-          <a:bodyPr/>
-          <a:lstStyle/>
-          <a:p>
-            <a:endParaRPr lang="es-AR"/>
-          </a:p>
-        </p:txBody>
-      </p:sp>
-      <p:sp>
-        <p:nvSpPr>
-          <p:cNvPr id="17" name="TextBox 17"/>
-          <p:cNvSpPr txBox="1"/>
-          <p:nvPr/>
-        </p:nvSpPr>
-        <p:spPr>
-          <a:xfrm>
-            <a:off x="2884562" y="460568"/>
-            <a:ext cx="15011841" cy="1566544"/>
-          </a:xfrm>
-          <a:prstGeom prst="rect">
-            <a:avLst/>
-          </a:prstGeom>
-        </p:spPr>
-        <p:txBody>
-          <a:bodyPr lIns="0" tIns="0" rIns="0" bIns="0" rtlCol="0" anchor="t">
-            <a:spAutoFit/>
-          </a:bodyPr>
-          <a:lstStyle/>
-          <a:p>
-            <a:pPr algn="ctr">
-              <a:lnSpc>
-                <a:spcPts val="12880"/>
-              </a:lnSpc>
-            </a:pPr>
-            <a:r>
-              <a:rPr lang="es-AR" sz="9200" dirty="0">
-                <a:solidFill>
-                  <a:srgbClr val="F7F4FA"/>
-                </a:solidFill>
-                <a:latin typeface="Open Sans Bold"/>
-              </a:rPr>
-              <a:t>Ejemplo</a:t>
-            </a:r>
-          </a:p>
-        </p:txBody>
-      </p:sp>
-    </p:spTree>
-    <p:extLst>
-      <p:ext uri="{BB962C8B-B14F-4D97-AF65-F5344CB8AC3E}">
-        <p14:creationId xmlns:p14="http://schemas.microsoft.com/office/powerpoint/2010/main" val="943621259"/>
-      </p:ext>
-    </p:extLst>
   </p:cSld>
   <p:clrMapOvr>
     <a:masterClrMapping/>

</xml_diff>